<commit_message>
ENH: Verions 0.9 of documentation
</commit_message>
<xml_diff>
--- a/documentation/content/gallery/Notes.pptx
+++ b/documentation/content/gallery/Notes.pptx
@@ -6,10 +6,12 @@
   </p:sldMasterIdLst>
   <p:sldIdLst>
     <p:sldId id="256" r:id="rId2"/>
-    <p:sldId id="258" r:id="rId3"/>
-    <p:sldId id="259" r:id="rId4"/>
-    <p:sldId id="257" r:id="rId5"/>
-    <p:sldId id="260" r:id="rId6"/>
+    <p:sldId id="261" r:id="rId3"/>
+    <p:sldId id="258" r:id="rId4"/>
+    <p:sldId id="259" r:id="rId5"/>
+    <p:sldId id="262" r:id="rId6"/>
+    <p:sldId id="257" r:id="rId7"/>
+    <p:sldId id="260" r:id="rId8"/>
   </p:sldIdLst>
   <p:sldSz cx="12192000" cy="6858000"/>
   <p:notesSz cx="6858000" cy="9144000"/>
@@ -108,6 +110,11 @@
       </a:defRPr>
     </a:lvl9pPr>
   </p:defaultTextStyle>
+  <p:extLst>
+    <p:ext uri="{EFAFB233-063F-42B5-8137-9DF3F51BA10A}">
+      <p15:sldGuideLst xmlns:p15="http://schemas.microsoft.com/office/powerpoint/2012/main"/>
+    </p:ext>
+  </p:extLst>
 </p:presentation>
 </file>
 
@@ -258,7 +265,7 @@
           <a:p>
             <a:fld id="{819EFE7B-06EB-4D89-8F1C-B19CABC81478}" type="datetimeFigureOut">
               <a:rPr lang="en-US" smtClean="0"/>
-              <a:t>11/17/2022</a:t>
+              <a:t>11/20/2022</a:t>
             </a:fld>
             <a:endParaRPr lang="en-US"/>
           </a:p>
@@ -456,7 +463,7 @@
           <a:p>
             <a:fld id="{819EFE7B-06EB-4D89-8F1C-B19CABC81478}" type="datetimeFigureOut">
               <a:rPr lang="en-US" smtClean="0"/>
-              <a:t>11/17/2022</a:t>
+              <a:t>11/20/2022</a:t>
             </a:fld>
             <a:endParaRPr lang="en-US"/>
           </a:p>
@@ -664,7 +671,7 @@
           <a:p>
             <a:fld id="{819EFE7B-06EB-4D89-8F1C-B19CABC81478}" type="datetimeFigureOut">
               <a:rPr lang="en-US" smtClean="0"/>
-              <a:t>11/17/2022</a:t>
+              <a:t>11/20/2022</a:t>
             </a:fld>
             <a:endParaRPr lang="en-US"/>
           </a:p>
@@ -862,7 +869,7 @@
           <a:p>
             <a:fld id="{819EFE7B-06EB-4D89-8F1C-B19CABC81478}" type="datetimeFigureOut">
               <a:rPr lang="en-US" smtClean="0"/>
-              <a:t>11/17/2022</a:t>
+              <a:t>11/20/2022</a:t>
             </a:fld>
             <a:endParaRPr lang="en-US"/>
           </a:p>
@@ -1137,7 +1144,7 @@
           <a:p>
             <a:fld id="{819EFE7B-06EB-4D89-8F1C-B19CABC81478}" type="datetimeFigureOut">
               <a:rPr lang="en-US" smtClean="0"/>
-              <a:t>11/17/2022</a:t>
+              <a:t>11/20/2022</a:t>
             </a:fld>
             <a:endParaRPr lang="en-US"/>
           </a:p>
@@ -1402,7 +1409,7 @@
           <a:p>
             <a:fld id="{819EFE7B-06EB-4D89-8F1C-B19CABC81478}" type="datetimeFigureOut">
               <a:rPr lang="en-US" smtClean="0"/>
-              <a:t>11/17/2022</a:t>
+              <a:t>11/20/2022</a:t>
             </a:fld>
             <a:endParaRPr lang="en-US"/>
           </a:p>
@@ -1814,7 +1821,7 @@
           <a:p>
             <a:fld id="{819EFE7B-06EB-4D89-8F1C-B19CABC81478}" type="datetimeFigureOut">
               <a:rPr lang="en-US" smtClean="0"/>
-              <a:t>11/17/2022</a:t>
+              <a:t>11/20/2022</a:t>
             </a:fld>
             <a:endParaRPr lang="en-US"/>
           </a:p>
@@ -1955,7 +1962,7 @@
           <a:p>
             <a:fld id="{819EFE7B-06EB-4D89-8F1C-B19CABC81478}" type="datetimeFigureOut">
               <a:rPr lang="en-US" smtClean="0"/>
-              <a:t>11/17/2022</a:t>
+              <a:t>11/20/2022</a:t>
             </a:fld>
             <a:endParaRPr lang="en-US"/>
           </a:p>
@@ -2068,7 +2075,7 @@
           <a:p>
             <a:fld id="{819EFE7B-06EB-4D89-8F1C-B19CABC81478}" type="datetimeFigureOut">
               <a:rPr lang="en-US" smtClean="0"/>
-              <a:t>11/17/2022</a:t>
+              <a:t>11/20/2022</a:t>
             </a:fld>
             <a:endParaRPr lang="en-US"/>
           </a:p>
@@ -2379,7 +2386,7 @@
           <a:p>
             <a:fld id="{819EFE7B-06EB-4D89-8F1C-B19CABC81478}" type="datetimeFigureOut">
               <a:rPr lang="en-US" smtClean="0"/>
-              <a:t>11/17/2022</a:t>
+              <a:t>11/20/2022</a:t>
             </a:fld>
             <a:endParaRPr lang="en-US"/>
           </a:p>
@@ -2667,7 +2674,7 @@
           <a:p>
             <a:fld id="{819EFE7B-06EB-4D89-8F1C-B19CABC81478}" type="datetimeFigureOut">
               <a:rPr lang="en-US" smtClean="0"/>
-              <a:t>11/17/2022</a:t>
+              <a:t>11/20/2022</a:t>
             </a:fld>
             <a:endParaRPr lang="en-US"/>
           </a:p>
@@ -2908,7 +2915,7 @@
           <a:p>
             <a:fld id="{819EFE7B-06EB-4D89-8F1C-B19CABC81478}" type="datetimeFigureOut">
               <a:rPr lang="en-US" smtClean="0"/>
-              <a:t>11/17/2022</a:t>
+              <a:t>11/20/2022</a:t>
             </a:fld>
             <a:endParaRPr lang="en-US"/>
           </a:p>
@@ -3848,10 +3855,10 @@
       </p:grpSpPr>
       <p:pic>
         <p:nvPicPr>
-          <p:cNvPr id="7" name="Picture 6" descr="A screenshot of a video game&#10;&#10;Description automatically generated with medium confidence">
-            <a:extLst>
-              <a:ext uri="{FF2B5EF4-FFF2-40B4-BE49-F238E27FC236}">
-                <a16:creationId xmlns:a16="http://schemas.microsoft.com/office/drawing/2014/main" id="{18FA5872-5D88-9D5F-7636-B7F02B7FED9C}"/>
+          <p:cNvPr id="8" name="Picture 7" descr="A screenshot of a video game&#10;&#10;Description automatically generated with medium confidence">
+            <a:extLst>
+              <a:ext uri="{FF2B5EF4-FFF2-40B4-BE49-F238E27FC236}">
+                <a16:creationId xmlns:a16="http://schemas.microsoft.com/office/drawing/2014/main" id="{15E2AB43-2384-161F-376A-93788ED2E4D0}"/>
               </a:ext>
             </a:extLst>
           </p:cNvPr>
@@ -3874,8 +3881,8 @@
         </p:blipFill>
         <p:spPr>
           <a:xfrm>
-            <a:off x="339525" y="0"/>
-            <a:ext cx="11512950" cy="6858000"/>
+            <a:off x="0" y="149225"/>
+            <a:ext cx="12192000" cy="6559550"/>
           </a:xfrm>
           <a:prstGeom prst="rect">
             <a:avLst/>
@@ -3887,7 +3894,7 @@
           <p:cNvPr id="4" name="Rectangle 3">
             <a:extLst>
               <a:ext uri="{FF2B5EF4-FFF2-40B4-BE49-F238E27FC236}">
-                <a16:creationId xmlns:a16="http://schemas.microsoft.com/office/drawing/2014/main" id="{02B59F2A-F43B-C3E6-8B5D-DCAC60176F41}"/>
+                <a16:creationId xmlns:a16="http://schemas.microsoft.com/office/drawing/2014/main" id="{90DADFDC-F85B-DDA6-EE56-8F8EDD4957D8}"/>
               </a:ext>
             </a:extLst>
           </p:cNvPr>
@@ -3896,8 +3903,8 @@
         </p:nvSpPr>
         <p:spPr>
           <a:xfrm>
-            <a:off x="3668199" y="1846332"/>
-            <a:ext cx="466218" cy="972437"/>
+            <a:off x="2745132" y="1680485"/>
+            <a:ext cx="414098" cy="456004"/>
           </a:xfrm>
           <a:prstGeom prst="rect">
             <a:avLst/>
@@ -3937,7 +3944,7 @@
           <p:cNvPr id="5" name="TextBox 4">
             <a:extLst>
               <a:ext uri="{FF2B5EF4-FFF2-40B4-BE49-F238E27FC236}">
-                <a16:creationId xmlns:a16="http://schemas.microsoft.com/office/drawing/2014/main" id="{C74A2859-D70D-C11C-6E74-7D68627AB8EF}"/>
+                <a16:creationId xmlns:a16="http://schemas.microsoft.com/office/drawing/2014/main" id="{3186FC25-9460-B019-0CE7-50C83018A707}"/>
               </a:ext>
             </a:extLst>
           </p:cNvPr>
@@ -3946,8 +3953,8 @@
         </p:nvSpPr>
         <p:spPr>
           <a:xfrm>
-            <a:off x="4066989" y="1865941"/>
-            <a:ext cx="1581972" cy="923330"/>
+            <a:off x="1919521" y="1722139"/>
+            <a:ext cx="825611" cy="369332"/>
           </a:xfrm>
           <a:prstGeom prst="rect">
             <a:avLst/>
@@ -3968,35 +3975,65 @@
                   <a:schemeClr val="bg1"/>
                 </a:solidFill>
               </a:rPr>
-              <a:t>Window/Level</a:t>
-            </a:r>
-          </a:p>
-          <a:p>
-            <a:r>
-              <a:rPr lang="en-US" b="1" dirty="0">
-                <a:solidFill>
-                  <a:schemeClr val="bg1"/>
-                </a:solidFill>
-              </a:rPr>
-              <a:t>Pan</a:t>
-            </a:r>
-          </a:p>
-          <a:p>
-            <a:r>
-              <a:rPr lang="en-US" b="1" dirty="0">
-                <a:solidFill>
-                  <a:schemeClr val="bg1"/>
-                </a:solidFill>
-              </a:rPr>
-              <a:t>Zoom</a:t>
-            </a:r>
+              <a:t>Layout</a:t>
+            </a:r>
+          </a:p>
+        </p:txBody>
+      </p:sp>
+      <p:sp>
+        <p:nvSpPr>
+          <p:cNvPr id="6" name="Rectangle 5">
+            <a:extLst>
+              <a:ext uri="{FF2B5EF4-FFF2-40B4-BE49-F238E27FC236}">
+                <a16:creationId xmlns:a16="http://schemas.microsoft.com/office/drawing/2014/main" id="{960912BF-B2CC-BC48-7D80-B217F43FCB4C}"/>
+              </a:ext>
+            </a:extLst>
+          </p:cNvPr>
+          <p:cNvSpPr/>
+          <p:nvPr/>
+        </p:nvSpPr>
+        <p:spPr>
+          <a:xfrm>
+            <a:off x="3159230" y="1421437"/>
+            <a:ext cx="1105081" cy="1059576"/>
+          </a:xfrm>
+          <a:prstGeom prst="rect">
+            <a:avLst/>
+          </a:prstGeom>
+          <a:noFill/>
+          <a:ln w="38100">
+            <a:solidFill>
+              <a:srgbClr val="FF0000"/>
+            </a:solidFill>
+          </a:ln>
+        </p:spPr>
+        <p:style>
+          <a:lnRef idx="2">
+            <a:schemeClr val="accent6"/>
+          </a:lnRef>
+          <a:fillRef idx="1">
+            <a:schemeClr val="lt1"/>
+          </a:fillRef>
+          <a:effectRef idx="0">
+            <a:schemeClr val="accent6"/>
+          </a:effectRef>
+          <a:fontRef idx="minor">
+            <a:schemeClr val="dk1"/>
+          </a:fontRef>
+        </p:style>
+        <p:txBody>
+          <a:bodyPr rtlCol="0" anchor="ctr"/>
+          <a:lstStyle/>
+          <a:p>
+            <a:pPr algn="ctr"/>
+            <a:endParaRPr lang="en-US"/>
           </a:p>
         </p:txBody>
       </p:sp>
     </p:spTree>
     <p:extLst>
       <p:ext uri="{BB962C8B-B14F-4D97-AF65-F5344CB8AC3E}">
-        <p14:creationId xmlns:p14="http://schemas.microsoft.com/office/powerpoint/2010/main" val="867124964"/>
+        <p14:creationId xmlns:p14="http://schemas.microsoft.com/office/powerpoint/2010/main" val="226195226"/>
       </p:ext>
     </p:extLst>
   </p:cSld>
@@ -4025,10 +4062,10 @@
       </p:grpSpPr>
       <p:pic>
         <p:nvPicPr>
-          <p:cNvPr id="3" name="Picture 2" descr="A screenshot of a video game&#10;&#10;Description automatically generated with medium confidence">
-            <a:extLst>
-              <a:ext uri="{FF2B5EF4-FFF2-40B4-BE49-F238E27FC236}">
-                <a16:creationId xmlns:a16="http://schemas.microsoft.com/office/drawing/2014/main" id="{062C2E79-D607-C41A-D7D3-3C555CC2F064}"/>
+          <p:cNvPr id="3" name="Picture 2" descr="A screenshot of a skeleton&#10;&#10;Description automatically generated with low confidence">
+            <a:extLst>
+              <a:ext uri="{FF2B5EF4-FFF2-40B4-BE49-F238E27FC236}">
+                <a16:creationId xmlns:a16="http://schemas.microsoft.com/office/drawing/2014/main" id="{A9E1964E-FFA5-5607-6AFA-7BCF460B7FA9}"/>
               </a:ext>
             </a:extLst>
           </p:cNvPr>
@@ -4051,8 +4088,8 @@
         </p:blipFill>
         <p:spPr>
           <a:xfrm>
-            <a:off x="339525" y="0"/>
-            <a:ext cx="11512950" cy="6858000"/>
+            <a:off x="0" y="149225"/>
+            <a:ext cx="12192000" cy="6559550"/>
           </a:xfrm>
           <a:prstGeom prst="rect">
             <a:avLst/>
@@ -4064,7 +4101,7 @@
           <p:cNvPr id="4" name="Rectangle 3">
             <a:extLst>
               <a:ext uri="{FF2B5EF4-FFF2-40B4-BE49-F238E27FC236}">
-                <a16:creationId xmlns:a16="http://schemas.microsoft.com/office/drawing/2014/main" id="{B2B1A351-6156-F15F-5502-B7D507E908BC}"/>
+                <a16:creationId xmlns:a16="http://schemas.microsoft.com/office/drawing/2014/main" id="{02B59F2A-F43B-C3E6-8B5D-DCAC60176F41}"/>
               </a:ext>
             </a:extLst>
           </p:cNvPr>
@@ -4073,8 +4110,8 @@
         </p:nvSpPr>
         <p:spPr>
           <a:xfrm>
-            <a:off x="3600186" y="2806074"/>
-            <a:ext cx="466218" cy="1244491"/>
+            <a:off x="2805803" y="1716322"/>
+            <a:ext cx="466218" cy="1113551"/>
           </a:xfrm>
           <a:prstGeom prst="rect">
             <a:avLst/>
@@ -4114,7 +4151,7 @@
           <p:cNvPr id="5" name="TextBox 4">
             <a:extLst>
               <a:ext uri="{FF2B5EF4-FFF2-40B4-BE49-F238E27FC236}">
-                <a16:creationId xmlns:a16="http://schemas.microsoft.com/office/drawing/2014/main" id="{9432E7D7-22CA-548C-37D6-F93CD0C57E62}"/>
+                <a16:creationId xmlns:a16="http://schemas.microsoft.com/office/drawing/2014/main" id="{C74A2859-D70D-C11C-6E74-7D68627AB8EF}"/>
               </a:ext>
             </a:extLst>
           </p:cNvPr>
@@ -4123,8 +4160,8 @@
         </p:nvSpPr>
         <p:spPr>
           <a:xfrm>
-            <a:off x="3998976" y="2825683"/>
-            <a:ext cx="1155253" cy="1200329"/>
+            <a:off x="3159347" y="1672932"/>
+            <a:ext cx="1581972" cy="1200329"/>
           </a:xfrm>
           <a:prstGeom prst="rect">
             <a:avLst/>
@@ -4145,7 +4182,7 @@
                   <a:schemeClr val="bg1"/>
                 </a:solidFill>
               </a:rPr>
-              <a:t>Paint</a:t>
+              <a:t>Window/Level</a:t>
             </a:r>
           </a:p>
           <a:p>
@@ -4155,7 +4192,7 @@
                   <a:schemeClr val="bg1"/>
                 </a:solidFill>
               </a:rPr>
-              <a:t>Crop</a:t>
+              <a:t>Pan</a:t>
             </a:r>
           </a:p>
           <a:p>
@@ -4165,7 +4202,7 @@
                   <a:schemeClr val="bg1"/>
                 </a:solidFill>
               </a:rPr>
-              <a:t>Ruler</a:t>
+              <a:t>Zoom</a:t>
             </a:r>
           </a:p>
           <a:p>
@@ -4183,7 +4220,7 @@
     </p:spTree>
     <p:extLst>
       <p:ext uri="{BB962C8B-B14F-4D97-AF65-F5344CB8AC3E}">
-        <p14:creationId xmlns:p14="http://schemas.microsoft.com/office/powerpoint/2010/main" val="212144867"/>
+        <p14:creationId xmlns:p14="http://schemas.microsoft.com/office/powerpoint/2010/main" val="867124964"/>
       </p:ext>
     </p:extLst>
   </p:cSld>
@@ -4212,6 +4249,330 @@
       </p:grpSpPr>
       <p:pic>
         <p:nvPicPr>
+          <p:cNvPr id="6" name="Picture 5" descr="A screenshot of a video game&#10;&#10;Description automatically generated with medium confidence">
+            <a:extLst>
+              <a:ext uri="{FF2B5EF4-FFF2-40B4-BE49-F238E27FC236}">
+                <a16:creationId xmlns:a16="http://schemas.microsoft.com/office/drawing/2014/main" id="{CD0F8884-B886-FE3A-2350-9AE2CA334181}"/>
+              </a:ext>
+            </a:extLst>
+          </p:cNvPr>
+          <p:cNvPicPr>
+            <a:picLocks noChangeAspect="1"/>
+          </p:cNvPicPr>
+          <p:nvPr/>
+        </p:nvPicPr>
+        <p:blipFill>
+          <a:blip r:embed="rId2">
+            <a:extLst>
+              <a:ext uri="{28A0092B-C50C-407E-A947-70E740481C1C}">
+                <a14:useLocalDpi xmlns:a14="http://schemas.microsoft.com/office/drawing/2010/main" val="0"/>
+              </a:ext>
+            </a:extLst>
+          </a:blip>
+          <a:stretch>
+            <a:fillRect/>
+          </a:stretch>
+        </p:blipFill>
+        <p:spPr>
+          <a:xfrm>
+            <a:off x="0" y="149225"/>
+            <a:ext cx="12192000" cy="6559550"/>
+          </a:xfrm>
+          <a:prstGeom prst="rect">
+            <a:avLst/>
+          </a:prstGeom>
+        </p:spPr>
+      </p:pic>
+      <p:sp>
+        <p:nvSpPr>
+          <p:cNvPr id="4" name="Rectangle 3">
+            <a:extLst>
+              <a:ext uri="{FF2B5EF4-FFF2-40B4-BE49-F238E27FC236}">
+                <a16:creationId xmlns:a16="http://schemas.microsoft.com/office/drawing/2014/main" id="{B2B1A351-6156-F15F-5502-B7D507E908BC}"/>
+              </a:ext>
+            </a:extLst>
+          </p:cNvPr>
+          <p:cNvSpPr/>
+          <p:nvPr/>
+        </p:nvSpPr>
+        <p:spPr>
+          <a:xfrm>
+            <a:off x="2811462" y="2803602"/>
+            <a:ext cx="466218" cy="593980"/>
+          </a:xfrm>
+          <a:prstGeom prst="rect">
+            <a:avLst/>
+          </a:prstGeom>
+          <a:noFill/>
+          <a:ln w="38100">
+            <a:solidFill>
+              <a:srgbClr val="FF0000"/>
+            </a:solidFill>
+          </a:ln>
+        </p:spPr>
+        <p:style>
+          <a:lnRef idx="2">
+            <a:schemeClr val="accent6"/>
+          </a:lnRef>
+          <a:fillRef idx="1">
+            <a:schemeClr val="lt1"/>
+          </a:fillRef>
+          <a:effectRef idx="0">
+            <a:schemeClr val="accent6"/>
+          </a:effectRef>
+          <a:fontRef idx="minor">
+            <a:schemeClr val="dk1"/>
+          </a:fontRef>
+        </p:style>
+        <p:txBody>
+          <a:bodyPr rtlCol="0" anchor="ctr"/>
+          <a:lstStyle/>
+          <a:p>
+            <a:pPr algn="ctr"/>
+            <a:endParaRPr lang="en-US"/>
+          </a:p>
+        </p:txBody>
+      </p:sp>
+      <p:sp>
+        <p:nvSpPr>
+          <p:cNvPr id="5" name="TextBox 4">
+            <a:extLst>
+              <a:ext uri="{FF2B5EF4-FFF2-40B4-BE49-F238E27FC236}">
+                <a16:creationId xmlns:a16="http://schemas.microsoft.com/office/drawing/2014/main" id="{9432E7D7-22CA-548C-37D6-F93CD0C57E62}"/>
+              </a:ext>
+            </a:extLst>
+          </p:cNvPr>
+          <p:cNvSpPr txBox="1"/>
+          <p:nvPr/>
+        </p:nvSpPr>
+        <p:spPr>
+          <a:xfrm>
+            <a:off x="3184250" y="2781760"/>
+            <a:ext cx="691215" cy="646331"/>
+          </a:xfrm>
+          <a:prstGeom prst="rect">
+            <a:avLst/>
+          </a:prstGeom>
+          <a:solidFill>
+            <a:srgbClr val="FF0000"/>
+          </a:solidFill>
+        </p:spPr>
+        <p:txBody>
+          <a:bodyPr wrap="none" rtlCol="0">
+            <a:spAutoFit/>
+          </a:bodyPr>
+          <a:lstStyle/>
+          <a:p>
+            <a:r>
+              <a:rPr lang="en-US" b="1" dirty="0">
+                <a:solidFill>
+                  <a:schemeClr val="bg1"/>
+                </a:solidFill>
+              </a:rPr>
+              <a:t>Paint</a:t>
+            </a:r>
+          </a:p>
+          <a:p>
+            <a:r>
+              <a:rPr lang="en-US" b="1" dirty="0">
+                <a:solidFill>
+                  <a:schemeClr val="bg1"/>
+                </a:solidFill>
+              </a:rPr>
+              <a:t>Ruler</a:t>
+            </a:r>
+          </a:p>
+        </p:txBody>
+      </p:sp>
+    </p:spTree>
+    <p:extLst>
+      <p:ext uri="{BB962C8B-B14F-4D97-AF65-F5344CB8AC3E}">
+        <p14:creationId xmlns:p14="http://schemas.microsoft.com/office/powerpoint/2010/main" val="212144867"/>
+      </p:ext>
+    </p:extLst>
+  </p:cSld>
+  <p:clrMapOvr>
+    <a:masterClrMapping/>
+  </p:clrMapOvr>
+</p:sld>
+</file>
+
+<file path=ppt/slides/slide5.xml><?xml version="1.0" encoding="utf-8"?>
+<p:sld xmlns:a="http://schemas.openxmlformats.org/drawingml/2006/main" xmlns:r="http://schemas.openxmlformats.org/officeDocument/2006/relationships" xmlns:p="http://schemas.openxmlformats.org/presentationml/2006/main">
+  <p:cSld>
+    <p:spTree>
+      <p:nvGrpSpPr>
+        <p:cNvPr id="1" name=""/>
+        <p:cNvGrpSpPr/>
+        <p:nvPr/>
+      </p:nvGrpSpPr>
+      <p:grpSpPr>
+        <a:xfrm>
+          <a:off x="0" y="0"/>
+          <a:ext cx="0" cy="0"/>
+          <a:chOff x="0" y="0"/>
+          <a:chExt cx="0" cy="0"/>
+        </a:xfrm>
+      </p:grpSpPr>
+      <p:pic>
+        <p:nvPicPr>
+          <p:cNvPr id="3" name="Picture 2" descr="A screenshot of a video game&#10;&#10;Description automatically generated">
+            <a:extLst>
+              <a:ext uri="{FF2B5EF4-FFF2-40B4-BE49-F238E27FC236}">
+                <a16:creationId xmlns:a16="http://schemas.microsoft.com/office/drawing/2014/main" id="{F9FE933A-5671-366D-07E2-13DC41A2A176}"/>
+              </a:ext>
+            </a:extLst>
+          </p:cNvPr>
+          <p:cNvPicPr>
+            <a:picLocks noChangeAspect="1"/>
+          </p:cNvPicPr>
+          <p:nvPr/>
+        </p:nvPicPr>
+        <p:blipFill>
+          <a:blip r:embed="rId2">
+            <a:extLst>
+              <a:ext uri="{28A0092B-C50C-407E-A947-70E740481C1C}">
+                <a14:useLocalDpi xmlns:a14="http://schemas.microsoft.com/office/drawing/2010/main" val="0"/>
+              </a:ext>
+            </a:extLst>
+          </a:blip>
+          <a:stretch>
+            <a:fillRect/>
+          </a:stretch>
+        </p:blipFill>
+        <p:spPr>
+          <a:xfrm>
+            <a:off x="0" y="149225"/>
+            <a:ext cx="12192000" cy="6559550"/>
+          </a:xfrm>
+          <a:prstGeom prst="rect">
+            <a:avLst/>
+          </a:prstGeom>
+        </p:spPr>
+      </p:pic>
+      <p:sp>
+        <p:nvSpPr>
+          <p:cNvPr id="4" name="Rectangle 3">
+            <a:extLst>
+              <a:ext uri="{FF2B5EF4-FFF2-40B4-BE49-F238E27FC236}">
+                <a16:creationId xmlns:a16="http://schemas.microsoft.com/office/drawing/2014/main" id="{6BDC7485-9FED-6F48-9EA1-0BE2378A44B1}"/>
+              </a:ext>
+            </a:extLst>
+          </p:cNvPr>
+          <p:cNvSpPr/>
+          <p:nvPr/>
+        </p:nvSpPr>
+        <p:spPr>
+          <a:xfrm>
+            <a:off x="2778038" y="3352680"/>
+            <a:ext cx="466218" cy="369332"/>
+          </a:xfrm>
+          <a:prstGeom prst="rect">
+            <a:avLst/>
+          </a:prstGeom>
+          <a:noFill/>
+          <a:ln w="38100">
+            <a:solidFill>
+              <a:srgbClr val="FF0000"/>
+            </a:solidFill>
+          </a:ln>
+        </p:spPr>
+        <p:style>
+          <a:lnRef idx="2">
+            <a:schemeClr val="accent6"/>
+          </a:lnRef>
+          <a:fillRef idx="1">
+            <a:schemeClr val="lt1"/>
+          </a:fillRef>
+          <a:effectRef idx="0">
+            <a:schemeClr val="accent6"/>
+          </a:effectRef>
+          <a:fontRef idx="minor">
+            <a:schemeClr val="dk1"/>
+          </a:fontRef>
+        </p:style>
+        <p:txBody>
+          <a:bodyPr rtlCol="0" anchor="ctr"/>
+          <a:lstStyle/>
+          <a:p>
+            <a:pPr algn="ctr"/>
+            <a:endParaRPr lang="en-US"/>
+          </a:p>
+        </p:txBody>
+      </p:sp>
+      <p:sp>
+        <p:nvSpPr>
+          <p:cNvPr id="5" name="TextBox 4">
+            <a:extLst>
+              <a:ext uri="{FF2B5EF4-FFF2-40B4-BE49-F238E27FC236}">
+                <a16:creationId xmlns:a16="http://schemas.microsoft.com/office/drawing/2014/main" id="{B301CECC-C750-4390-17B5-4C9A3E3CA36F}"/>
+              </a:ext>
+            </a:extLst>
+          </p:cNvPr>
+          <p:cNvSpPr txBox="1"/>
+          <p:nvPr/>
+        </p:nvSpPr>
+        <p:spPr>
+          <a:xfrm>
+            <a:off x="3244591" y="3352680"/>
+            <a:ext cx="632289" cy="369332"/>
+          </a:xfrm>
+          <a:prstGeom prst="rect">
+            <a:avLst/>
+          </a:prstGeom>
+          <a:solidFill>
+            <a:srgbClr val="FF0000"/>
+          </a:solidFill>
+        </p:spPr>
+        <p:txBody>
+          <a:bodyPr wrap="none" rtlCol="0">
+            <a:spAutoFit/>
+          </a:bodyPr>
+          <a:lstStyle/>
+          <a:p>
+            <a:r>
+              <a:rPr lang="en-US" b="1" dirty="0">
+                <a:solidFill>
+                  <a:schemeClr val="bg1"/>
+                </a:solidFill>
+              </a:rPr>
+              <a:t>Crop</a:t>
+            </a:r>
+          </a:p>
+        </p:txBody>
+      </p:sp>
+    </p:spTree>
+    <p:extLst>
+      <p:ext uri="{BB962C8B-B14F-4D97-AF65-F5344CB8AC3E}">
+        <p14:creationId xmlns:p14="http://schemas.microsoft.com/office/powerpoint/2010/main" val="234786398"/>
+      </p:ext>
+    </p:extLst>
+  </p:cSld>
+  <p:clrMapOvr>
+    <a:masterClrMapping/>
+  </p:clrMapOvr>
+</p:sld>
+</file>
+
+<file path=ppt/slides/slide6.xml><?xml version="1.0" encoding="utf-8"?>
+<p:sld xmlns:a="http://schemas.openxmlformats.org/drawingml/2006/main" xmlns:r="http://schemas.openxmlformats.org/officeDocument/2006/relationships" xmlns:p="http://schemas.openxmlformats.org/presentationml/2006/main">
+  <p:cSld>
+    <p:spTree>
+      <p:nvGrpSpPr>
+        <p:cNvPr id="1" name=""/>
+        <p:cNvGrpSpPr/>
+        <p:nvPr/>
+      </p:nvGrpSpPr>
+      <p:grpSpPr>
+        <a:xfrm>
+          <a:off x="0" y="0"/>
+          <a:ext cx="0" cy="0"/>
+          <a:chOff x="0" y="0"/>
+          <a:chExt cx="0" cy="0"/>
+        </a:xfrm>
+      </p:grpSpPr>
+      <p:pic>
+        <p:nvPicPr>
           <p:cNvPr id="13" name="Picture 12" descr="A screenshot of a video game&#10;&#10;Description automatically generated with medium confidence">
             <a:extLst>
               <a:ext uri="{FF2B5EF4-FFF2-40B4-BE49-F238E27FC236}">
@@ -4512,7 +4873,7 @@
 </p:sld>
 </file>
 
-<file path=ppt/slides/slide5.xml><?xml version="1.0" encoding="utf-8"?>
+<file path=ppt/slides/slide7.xml><?xml version="1.0" encoding="utf-8"?>
 <p:sld xmlns:a="http://schemas.openxmlformats.org/drawingml/2006/main" xmlns:r="http://schemas.openxmlformats.org/officeDocument/2006/relationships" xmlns:p="http://schemas.openxmlformats.org/presentationml/2006/main">
   <p:cSld>
     <p:spTree>

</xml_diff>